<commit_message>
presentation updates - enzyme
</commit_message>
<xml_diff>
--- a/presentation.pptx
+++ b/presentation.pptx
@@ -5,7 +5,7 @@
     <p:sldMasterId id="2147483657" r:id="rId1"/>
   </p:sldMasterIdLst>
   <p:notesMasterIdLst>
-    <p:notesMasterId r:id="rId9"/>
+    <p:notesMasterId r:id="rId12"/>
   </p:notesMasterIdLst>
   <p:sldIdLst>
     <p:sldId id="256" r:id="rId2"/>
@@ -13,8 +13,11 @@
     <p:sldId id="260" r:id="rId4"/>
     <p:sldId id="272" r:id="rId5"/>
     <p:sldId id="284" r:id="rId6"/>
-    <p:sldId id="287" r:id="rId7"/>
-    <p:sldId id="288" r:id="rId8"/>
+    <p:sldId id="290" r:id="rId7"/>
+    <p:sldId id="292" r:id="rId8"/>
+    <p:sldId id="291" r:id="rId9"/>
+    <p:sldId id="287" r:id="rId10"/>
+    <p:sldId id="288" r:id="rId11"/>
   </p:sldIdLst>
   <p:sldSz cx="9144000" cy="5143500" type="screen16x9"/>
   <p:notesSz cx="6858000" cy="9144000"/>
@@ -793,6 +796,115 @@
 </p:notes>
 </file>
 
+<file path=ppt/notesSlides/notesSlide10.xml><?xml version="1.0" encoding="utf-8"?>
+<p:notes xmlns:a="http://schemas.openxmlformats.org/drawingml/2006/main" xmlns:r="http://schemas.openxmlformats.org/officeDocument/2006/relationships" xmlns:p="http://schemas.openxmlformats.org/presentationml/2006/main" showMasterSp="0" showMasterPhAnim="0">
+  <p:cSld>
+    <p:spTree>
+      <p:nvGrpSpPr>
+        <p:cNvPr id="1" name="Shape 50"/>
+        <p:cNvGrpSpPr/>
+        <p:nvPr/>
+      </p:nvGrpSpPr>
+      <p:grpSpPr>
+        <a:xfrm>
+          <a:off x="0" y="0"/>
+          <a:ext cx="0" cy="0"/>
+          <a:chOff x="0" y="0"/>
+          <a:chExt cx="0" cy="0"/>
+        </a:xfrm>
+      </p:grpSpPr>
+      <p:sp>
+        <p:nvSpPr>
+          <p:cNvPr id="51" name="Google Shape;51;g35f391192_00:notes"/>
+          <p:cNvSpPr>
+            <a:spLocks noGrp="1" noRot="1" noChangeAspect="1"/>
+          </p:cNvSpPr>
+          <p:nvPr>
+            <p:ph type="sldImg" idx="2"/>
+          </p:nvPr>
+        </p:nvSpPr>
+        <p:spPr>
+          <a:xfrm>
+            <a:off x="381000" y="685800"/>
+            <a:ext cx="6096000" cy="3429000"/>
+          </a:xfrm>
+          <a:custGeom>
+            <a:avLst/>
+            <a:gdLst/>
+            <a:ahLst/>
+            <a:cxnLst/>
+            <a:rect l="l" t="t" r="r" b="b"/>
+            <a:pathLst>
+              <a:path w="120000" h="120000" extrusionOk="0">
+                <a:moveTo>
+                  <a:pt x="0" y="0"/>
+                </a:moveTo>
+                <a:lnTo>
+                  <a:pt x="120000" y="0"/>
+                </a:lnTo>
+                <a:lnTo>
+                  <a:pt x="120000" y="120000"/>
+                </a:lnTo>
+                <a:lnTo>
+                  <a:pt x="0" y="120000"/>
+                </a:lnTo>
+                <a:close/>
+              </a:path>
+            </a:pathLst>
+          </a:custGeom>
+        </p:spPr>
+      </p:sp>
+      <p:sp>
+        <p:nvSpPr>
+          <p:cNvPr id="52" name="Google Shape;52;g35f391192_00:notes"/>
+          <p:cNvSpPr txBox="1">
+            <a:spLocks noGrp="1"/>
+          </p:cNvSpPr>
+          <p:nvPr>
+            <p:ph type="body" idx="1"/>
+          </p:nvPr>
+        </p:nvSpPr>
+        <p:spPr>
+          <a:xfrm>
+            <a:off x="685800" y="4343400"/>
+            <a:ext cx="5486400" cy="4114800"/>
+          </a:xfrm>
+          <a:prstGeom prst="rect">
+            <a:avLst/>
+          </a:prstGeom>
+        </p:spPr>
+        <p:txBody>
+          <a:bodyPr spcFirstLastPara="1" wrap="square" lIns="91425" tIns="91425" rIns="91425" bIns="91425" anchor="t" anchorCtr="0">
+            <a:noAutofit/>
+          </a:bodyPr>
+          <a:lstStyle/>
+          <a:p>
+            <a:pPr marL="0" lvl="0" indent="0" algn="l" rtl="0">
+              <a:spcBef>
+                <a:spcPts val="0"/>
+              </a:spcBef>
+              <a:spcAft>
+                <a:spcPts val="0"/>
+              </a:spcAft>
+              <a:buNone/>
+            </a:pPr>
+            <a:endParaRPr/>
+          </a:p>
+        </p:txBody>
+      </p:sp>
+    </p:spTree>
+    <p:extLst>
+      <p:ext uri="{BB962C8B-B14F-4D97-AF65-F5344CB8AC3E}">
+        <p14:creationId xmlns:p14="http://schemas.microsoft.com/office/powerpoint/2010/main" val="137266168"/>
+      </p:ext>
+    </p:extLst>
+  </p:cSld>
+  <p:clrMapOvr>
+    <a:masterClrMapping/>
+  </p:clrMapOvr>
+</p:notes>
+</file>
+
 <file path=ppt/notesSlides/notesSlide2.xml><?xml version="1.0" encoding="utf-8"?>
 <p:notes xmlns:a="http://schemas.openxmlformats.org/drawingml/2006/main" xmlns:r="http://schemas.openxmlformats.org/officeDocument/2006/relationships" xmlns:p="http://schemas.openxmlformats.org/presentationml/2006/main" showMasterSp="0" showMasterPhAnim="0">
   <p:cSld>
@@ -1219,7 +1331,7 @@
   <p:cSld>
     <p:spTree>
       <p:nvGrpSpPr>
-        <p:cNvPr id="1" name="Shape 50"/>
+        <p:cNvPr id="1" name="Shape 77"/>
         <p:cNvGrpSpPr/>
         <p:nvPr/>
       </p:nvGrpSpPr>
@@ -1233,7 +1345,7 @@
       </p:grpSpPr>
       <p:sp>
         <p:nvSpPr>
-          <p:cNvPr id="51" name="Google Shape;51;g35f391192_00:notes"/>
+          <p:cNvPr id="78" name="Google Shape;78;p:notes"/>
           <p:cNvSpPr>
             <a:spLocks noGrp="1" noRot="1" noChangeAspect="1"/>
           </p:cNvSpPr>
@@ -1274,7 +1386,7 @@
       </p:sp>
       <p:sp>
         <p:nvSpPr>
-          <p:cNvPr id="52" name="Google Shape;52;g35f391192_00:notes"/>
+          <p:cNvPr id="79" name="Google Shape;79;p:notes"/>
           <p:cNvSpPr txBox="1">
             <a:spLocks noGrp="1"/>
           </p:cNvSpPr>
@@ -1313,7 +1425,7 @@
     </p:spTree>
     <p:extLst>
       <p:ext uri="{BB962C8B-B14F-4D97-AF65-F5344CB8AC3E}">
-        <p14:creationId xmlns:p14="http://schemas.microsoft.com/office/powerpoint/2010/main" val="995468606"/>
+        <p14:creationId xmlns:p14="http://schemas.microsoft.com/office/powerpoint/2010/main" val="364242401"/>
       </p:ext>
     </p:extLst>
   </p:cSld>
@@ -1324,6 +1436,224 @@
 </file>
 
 <file path=ppt/notesSlides/notesSlide7.xml><?xml version="1.0" encoding="utf-8"?>
+<p:notes xmlns:a="http://schemas.openxmlformats.org/drawingml/2006/main" xmlns:r="http://schemas.openxmlformats.org/officeDocument/2006/relationships" xmlns:p="http://schemas.openxmlformats.org/presentationml/2006/main" showMasterSp="0" showMasterPhAnim="0">
+  <p:cSld>
+    <p:spTree>
+      <p:nvGrpSpPr>
+        <p:cNvPr id="1" name="Shape 77"/>
+        <p:cNvGrpSpPr/>
+        <p:nvPr/>
+      </p:nvGrpSpPr>
+      <p:grpSpPr>
+        <a:xfrm>
+          <a:off x="0" y="0"/>
+          <a:ext cx="0" cy="0"/>
+          <a:chOff x="0" y="0"/>
+          <a:chExt cx="0" cy="0"/>
+        </a:xfrm>
+      </p:grpSpPr>
+      <p:sp>
+        <p:nvSpPr>
+          <p:cNvPr id="78" name="Google Shape;78;p:notes"/>
+          <p:cNvSpPr>
+            <a:spLocks noGrp="1" noRot="1" noChangeAspect="1"/>
+          </p:cNvSpPr>
+          <p:nvPr>
+            <p:ph type="sldImg" idx="2"/>
+          </p:nvPr>
+        </p:nvSpPr>
+        <p:spPr>
+          <a:xfrm>
+            <a:off x="381000" y="685800"/>
+            <a:ext cx="6096000" cy="3429000"/>
+          </a:xfrm>
+          <a:custGeom>
+            <a:avLst/>
+            <a:gdLst/>
+            <a:ahLst/>
+            <a:cxnLst/>
+            <a:rect l="l" t="t" r="r" b="b"/>
+            <a:pathLst>
+              <a:path w="120000" h="120000" extrusionOk="0">
+                <a:moveTo>
+                  <a:pt x="0" y="0"/>
+                </a:moveTo>
+                <a:lnTo>
+                  <a:pt x="120000" y="0"/>
+                </a:lnTo>
+                <a:lnTo>
+                  <a:pt x="120000" y="120000"/>
+                </a:lnTo>
+                <a:lnTo>
+                  <a:pt x="0" y="120000"/>
+                </a:lnTo>
+                <a:close/>
+              </a:path>
+            </a:pathLst>
+          </a:custGeom>
+        </p:spPr>
+      </p:sp>
+      <p:sp>
+        <p:nvSpPr>
+          <p:cNvPr id="79" name="Google Shape;79;p:notes"/>
+          <p:cNvSpPr txBox="1">
+            <a:spLocks noGrp="1"/>
+          </p:cNvSpPr>
+          <p:nvPr>
+            <p:ph type="body" idx="1"/>
+          </p:nvPr>
+        </p:nvSpPr>
+        <p:spPr>
+          <a:xfrm>
+            <a:off x="685800" y="4343400"/>
+            <a:ext cx="5486400" cy="4114800"/>
+          </a:xfrm>
+          <a:prstGeom prst="rect">
+            <a:avLst/>
+          </a:prstGeom>
+        </p:spPr>
+        <p:txBody>
+          <a:bodyPr spcFirstLastPara="1" wrap="square" lIns="91425" tIns="91425" rIns="91425" bIns="91425" anchor="t" anchorCtr="0">
+            <a:noAutofit/>
+          </a:bodyPr>
+          <a:lstStyle/>
+          <a:p>
+            <a:pPr marL="0" lvl="0" indent="0" algn="l" rtl="0">
+              <a:spcBef>
+                <a:spcPts val="0"/>
+              </a:spcBef>
+              <a:spcAft>
+                <a:spcPts val="0"/>
+              </a:spcAft>
+              <a:buNone/>
+            </a:pPr>
+            <a:endParaRPr/>
+          </a:p>
+        </p:txBody>
+      </p:sp>
+    </p:spTree>
+    <p:extLst>
+      <p:ext uri="{BB962C8B-B14F-4D97-AF65-F5344CB8AC3E}">
+        <p14:creationId xmlns:p14="http://schemas.microsoft.com/office/powerpoint/2010/main" val="895234176"/>
+      </p:ext>
+    </p:extLst>
+  </p:cSld>
+  <p:clrMapOvr>
+    <a:masterClrMapping/>
+  </p:clrMapOvr>
+</p:notes>
+</file>
+
+<file path=ppt/notesSlides/notesSlide8.xml><?xml version="1.0" encoding="utf-8"?>
+<p:notes xmlns:a="http://schemas.openxmlformats.org/drawingml/2006/main" xmlns:r="http://schemas.openxmlformats.org/officeDocument/2006/relationships" xmlns:p="http://schemas.openxmlformats.org/presentationml/2006/main" showMasterSp="0" showMasterPhAnim="0">
+  <p:cSld>
+    <p:spTree>
+      <p:nvGrpSpPr>
+        <p:cNvPr id="1" name="Shape 77"/>
+        <p:cNvGrpSpPr/>
+        <p:nvPr/>
+      </p:nvGrpSpPr>
+      <p:grpSpPr>
+        <a:xfrm>
+          <a:off x="0" y="0"/>
+          <a:ext cx="0" cy="0"/>
+          <a:chOff x="0" y="0"/>
+          <a:chExt cx="0" cy="0"/>
+        </a:xfrm>
+      </p:grpSpPr>
+      <p:sp>
+        <p:nvSpPr>
+          <p:cNvPr id="78" name="Google Shape;78;p:notes"/>
+          <p:cNvSpPr>
+            <a:spLocks noGrp="1" noRot="1" noChangeAspect="1"/>
+          </p:cNvSpPr>
+          <p:nvPr>
+            <p:ph type="sldImg" idx="2"/>
+          </p:nvPr>
+        </p:nvSpPr>
+        <p:spPr>
+          <a:xfrm>
+            <a:off x="381000" y="685800"/>
+            <a:ext cx="6096000" cy="3429000"/>
+          </a:xfrm>
+          <a:custGeom>
+            <a:avLst/>
+            <a:gdLst/>
+            <a:ahLst/>
+            <a:cxnLst/>
+            <a:rect l="l" t="t" r="r" b="b"/>
+            <a:pathLst>
+              <a:path w="120000" h="120000" extrusionOk="0">
+                <a:moveTo>
+                  <a:pt x="0" y="0"/>
+                </a:moveTo>
+                <a:lnTo>
+                  <a:pt x="120000" y="0"/>
+                </a:lnTo>
+                <a:lnTo>
+                  <a:pt x="120000" y="120000"/>
+                </a:lnTo>
+                <a:lnTo>
+                  <a:pt x="0" y="120000"/>
+                </a:lnTo>
+                <a:close/>
+              </a:path>
+            </a:pathLst>
+          </a:custGeom>
+        </p:spPr>
+      </p:sp>
+      <p:sp>
+        <p:nvSpPr>
+          <p:cNvPr id="79" name="Google Shape;79;p:notes"/>
+          <p:cNvSpPr txBox="1">
+            <a:spLocks noGrp="1"/>
+          </p:cNvSpPr>
+          <p:nvPr>
+            <p:ph type="body" idx="1"/>
+          </p:nvPr>
+        </p:nvSpPr>
+        <p:spPr>
+          <a:xfrm>
+            <a:off x="685800" y="4343400"/>
+            <a:ext cx="5486400" cy="4114800"/>
+          </a:xfrm>
+          <a:prstGeom prst="rect">
+            <a:avLst/>
+          </a:prstGeom>
+        </p:spPr>
+        <p:txBody>
+          <a:bodyPr spcFirstLastPara="1" wrap="square" lIns="91425" tIns="91425" rIns="91425" bIns="91425" anchor="t" anchorCtr="0">
+            <a:noAutofit/>
+          </a:bodyPr>
+          <a:lstStyle/>
+          <a:p>
+            <a:pPr marL="0" lvl="0" indent="0" algn="l" rtl="0">
+              <a:spcBef>
+                <a:spcPts val="0"/>
+              </a:spcBef>
+              <a:spcAft>
+                <a:spcPts val="0"/>
+              </a:spcAft>
+              <a:buNone/>
+            </a:pPr>
+            <a:endParaRPr/>
+          </a:p>
+        </p:txBody>
+      </p:sp>
+    </p:spTree>
+    <p:extLst>
+      <p:ext uri="{BB962C8B-B14F-4D97-AF65-F5344CB8AC3E}">
+        <p14:creationId xmlns:p14="http://schemas.microsoft.com/office/powerpoint/2010/main" val="465858801"/>
+      </p:ext>
+    </p:extLst>
+  </p:cSld>
+  <p:clrMapOvr>
+    <a:masterClrMapping/>
+  </p:clrMapOvr>
+</p:notes>
+</file>
+
+<file path=ppt/notesSlides/notesSlide9.xml><?xml version="1.0" encoding="utf-8"?>
 <p:notes xmlns:a="http://schemas.openxmlformats.org/drawingml/2006/main" xmlns:r="http://schemas.openxmlformats.org/officeDocument/2006/relationships" xmlns:p="http://schemas.openxmlformats.org/presentationml/2006/main" showMasterSp="0" showMasterPhAnim="0">
   <p:cSld>
     <p:spTree>
@@ -1422,7 +1752,7 @@
     </p:spTree>
     <p:extLst>
       <p:ext uri="{BB962C8B-B14F-4D97-AF65-F5344CB8AC3E}">
-        <p14:creationId xmlns:p14="http://schemas.microsoft.com/office/powerpoint/2010/main" val="137266168"/>
+        <p14:creationId xmlns:p14="http://schemas.microsoft.com/office/powerpoint/2010/main" val="995468606"/>
       </p:ext>
     </p:extLst>
   </p:cSld>
@@ -4019,6 +4349,93 @@
         </p:txBody>
       </p:sp>
     </p:spTree>
+  </p:cSld>
+  <p:clrMapOvr>
+    <a:masterClrMapping/>
+  </p:clrMapOvr>
+  <p:timing>
+    <p:tnLst>
+      <p:par>
+        <p:cTn id="1" dur="indefinite" restart="never" nodeType="tmRoot"/>
+      </p:par>
+    </p:tnLst>
+  </p:timing>
+</p:sld>
+</file>
+
+<file path=ppt/slides/slide10.xml><?xml version="1.0" encoding="utf-8"?>
+<p:sld xmlns:a="http://schemas.openxmlformats.org/drawingml/2006/main" xmlns:r="http://schemas.openxmlformats.org/officeDocument/2006/relationships" xmlns:p="http://schemas.openxmlformats.org/presentationml/2006/main">
+  <p:cSld>
+    <p:spTree>
+      <p:nvGrpSpPr>
+        <p:cNvPr id="1" name="Shape 53"/>
+        <p:cNvGrpSpPr/>
+        <p:nvPr/>
+      </p:nvGrpSpPr>
+      <p:grpSpPr>
+        <a:xfrm>
+          <a:off x="0" y="0"/>
+          <a:ext cx="0" cy="0"/>
+          <a:chOff x="0" y="0"/>
+          <a:chExt cx="0" cy="0"/>
+        </a:xfrm>
+      </p:grpSpPr>
+      <p:sp>
+        <p:nvSpPr>
+          <p:cNvPr id="54" name="Google Shape;54;p11"/>
+          <p:cNvSpPr txBox="1">
+            <a:spLocks noGrp="1"/>
+          </p:cNvSpPr>
+          <p:nvPr>
+            <p:ph type="ctrTitle"/>
+          </p:nvPr>
+        </p:nvSpPr>
+        <p:spPr>
+          <a:xfrm>
+            <a:off x="685800" y="743850"/>
+            <a:ext cx="7102642" cy="1159800"/>
+          </a:xfrm>
+          <a:prstGeom prst="rect">
+            <a:avLst/>
+          </a:prstGeom>
+        </p:spPr>
+        <p:txBody>
+          <a:bodyPr spcFirstLastPara="1" wrap="square" lIns="0" tIns="0" rIns="0" bIns="0" anchor="t" anchorCtr="0">
+            <a:noAutofit/>
+          </a:bodyPr>
+          <a:lstStyle/>
+          <a:p>
+            <a:pPr marL="0" lvl="0" indent="0" algn="l" rtl="0">
+              <a:spcBef>
+                <a:spcPts val="0"/>
+              </a:spcBef>
+              <a:spcAft>
+                <a:spcPts val="0"/>
+              </a:spcAft>
+              <a:buNone/>
+            </a:pPr>
+            <a:r>
+              <a:rPr lang="en-US" dirty="0" smtClean="0">
+                <a:latin typeface="Hiragino Kaku Gothic Std W8" charset="-128"/>
+                <a:ea typeface="Hiragino Kaku Gothic Std W8" charset="-128"/>
+                <a:cs typeface="Hiragino Kaku Gothic Std W8" charset="-128"/>
+              </a:rPr>
+              <a:t>QUESTIONS?</a:t>
+            </a:r>
+            <a:endParaRPr dirty="0">
+              <a:latin typeface="Hiragino Kaku Gothic Std W8" charset="-128"/>
+              <a:ea typeface="Hiragino Kaku Gothic Std W8" charset="-128"/>
+              <a:cs typeface="Hiragino Kaku Gothic Std W8" charset="-128"/>
+            </a:endParaRPr>
+          </a:p>
+        </p:txBody>
+      </p:sp>
+    </p:spTree>
+    <p:extLst>
+      <p:ext uri="{BB962C8B-B14F-4D97-AF65-F5344CB8AC3E}">
+        <p14:creationId xmlns:p14="http://schemas.microsoft.com/office/powerpoint/2010/main" val="100565651"/>
+      </p:ext>
+    </p:extLst>
   </p:cSld>
   <p:clrMapOvr>
     <a:masterClrMapping/>
@@ -5981,6 +6398,666 @@
   <p:cSld>
     <p:spTree>
       <p:nvGrpSpPr>
+        <p:cNvPr id="1" name="Shape 80"/>
+        <p:cNvGrpSpPr/>
+        <p:nvPr/>
+      </p:nvGrpSpPr>
+      <p:grpSpPr>
+        <a:xfrm>
+          <a:off x="0" y="0"/>
+          <a:ext cx="0" cy="0"/>
+          <a:chOff x="0" y="0"/>
+          <a:chExt cx="0" cy="0"/>
+        </a:xfrm>
+      </p:grpSpPr>
+      <p:sp>
+        <p:nvSpPr>
+          <p:cNvPr id="81" name="Google Shape;81;p15"/>
+          <p:cNvSpPr txBox="1">
+            <a:spLocks noGrp="1"/>
+          </p:cNvSpPr>
+          <p:nvPr>
+            <p:ph type="title"/>
+          </p:nvPr>
+        </p:nvSpPr>
+        <p:spPr>
+          <a:xfrm>
+            <a:off x="457200" y="434575"/>
+            <a:ext cx="6025500" cy="857400"/>
+          </a:xfrm>
+          <a:prstGeom prst="rect">
+            <a:avLst/>
+          </a:prstGeom>
+        </p:spPr>
+        <p:txBody>
+          <a:bodyPr spcFirstLastPara="1" wrap="square" lIns="0" tIns="0" rIns="0" bIns="0" anchor="b" anchorCtr="0">
+            <a:noAutofit/>
+          </a:bodyPr>
+          <a:lstStyle/>
+          <a:p>
+            <a:pPr marL="0" lvl="0" indent="0" algn="l" rtl="0">
+              <a:spcBef>
+                <a:spcPts val="0"/>
+              </a:spcBef>
+              <a:spcAft>
+                <a:spcPts val="0"/>
+              </a:spcAft>
+              <a:buNone/>
+            </a:pPr>
+            <a:r>
+              <a:rPr lang="en-US" dirty="0" smtClean="0">
+                <a:latin typeface="Hiragino Kaku Gothic Std W8" charset="-128"/>
+                <a:ea typeface="Hiragino Kaku Gothic Std W8" charset="-128"/>
+                <a:cs typeface="Hiragino Kaku Gothic Std W8" charset="-128"/>
+              </a:rPr>
+              <a:t>A FEW DEFINITIONS</a:t>
+            </a:r>
+            <a:endParaRPr dirty="0">
+              <a:latin typeface="Hiragino Kaku Gothic Std W8" charset="-128"/>
+              <a:ea typeface="Hiragino Kaku Gothic Std W8" charset="-128"/>
+              <a:cs typeface="Hiragino Kaku Gothic Std W8" charset="-128"/>
+            </a:endParaRPr>
+          </a:p>
+        </p:txBody>
+      </p:sp>
+      <p:sp>
+        <p:nvSpPr>
+          <p:cNvPr id="82" name="Google Shape;82;p15"/>
+          <p:cNvSpPr txBox="1">
+            <a:spLocks noGrp="1"/>
+          </p:cNvSpPr>
+          <p:nvPr>
+            <p:ph type="body" idx="1"/>
+          </p:nvPr>
+        </p:nvSpPr>
+        <p:spPr>
+          <a:xfrm>
+            <a:off x="457200" y="1428748"/>
+            <a:ext cx="5683470" cy="3148800"/>
+          </a:xfrm>
+          <a:prstGeom prst="rect">
+            <a:avLst/>
+          </a:prstGeom>
+        </p:spPr>
+        <p:txBody>
+          <a:bodyPr spcFirstLastPara="1" wrap="square" lIns="0" tIns="0" rIns="0" bIns="0" anchor="t" anchorCtr="0">
+            <a:noAutofit/>
+          </a:bodyPr>
+          <a:lstStyle/>
+          <a:p>
+            <a:r>
+              <a:rPr lang="en-US" dirty="0">
+                <a:latin typeface="Hiragino Maru Gothic Pro W4" charset="-128"/>
+                <a:ea typeface="Hiragino Maru Gothic Pro W4" charset="-128"/>
+                <a:cs typeface="Hiragino Maru Gothic Pro W4" charset="-128"/>
+              </a:rPr>
+              <a:t>Jest - </a:t>
+            </a:r>
+            <a:r>
+              <a:rPr lang="en-US" dirty="0" smtClean="0">
+                <a:latin typeface="Hiragino Maru Gothic Pro W4" charset="-128"/>
+                <a:ea typeface="Hiragino Maru Gothic Pro W4" charset="-128"/>
+                <a:cs typeface="Hiragino Maru Gothic Pro W4" charset="-128"/>
+              </a:rPr>
+              <a:t>JavaScript testing framework with </a:t>
+            </a:r>
+            <a:r>
+              <a:rPr lang="en-US" dirty="0">
+                <a:latin typeface="Hiragino Maru Gothic Pro W4" charset="-128"/>
+                <a:ea typeface="Hiragino Maru Gothic Pro W4" charset="-128"/>
+                <a:cs typeface="Hiragino Maru Gothic Pro W4" charset="-128"/>
+              </a:rPr>
+              <a:t>a focus on simplicity</a:t>
+            </a:r>
+            <a:endParaRPr lang="en-US" dirty="0">
+              <a:latin typeface="Hiragino Maru Gothic Pro W4" charset="-128"/>
+              <a:ea typeface="Hiragino Maru Gothic Pro W4" charset="-128"/>
+              <a:cs typeface="Hiragino Maru Gothic Pro W4" charset="-128"/>
+            </a:endParaRPr>
+          </a:p>
+          <a:p>
+            <a:r>
+              <a:rPr lang="en-US" dirty="0">
+                <a:latin typeface="Hiragino Maru Gothic Pro W4" charset="-128"/>
+                <a:ea typeface="Hiragino Maru Gothic Pro W4" charset="-128"/>
+                <a:cs typeface="Hiragino Maru Gothic Pro W4" charset="-128"/>
+              </a:rPr>
+              <a:t>Enzyme -</a:t>
+            </a:r>
+            <a:r>
+              <a:rPr lang="en-US" dirty="0" smtClean="0">
+                <a:latin typeface="Hiragino Maru Gothic Pro W4" charset="-128"/>
+                <a:ea typeface="Hiragino Maru Gothic Pro W4" charset="-128"/>
+                <a:cs typeface="Hiragino Maru Gothic Pro W4" charset="-128"/>
+              </a:rPr>
+              <a:t> </a:t>
+            </a:r>
+            <a:r>
+              <a:rPr lang="en-US" dirty="0">
+                <a:latin typeface="Hiragino Maru Gothic Pro W4" charset="-128"/>
+                <a:ea typeface="Hiragino Maru Gothic Pro W4" charset="-128"/>
+                <a:cs typeface="Hiragino Maru Gothic Pro W4" charset="-128"/>
+              </a:rPr>
+              <a:t>JavaScript </a:t>
+            </a:r>
+            <a:r>
+              <a:rPr lang="en-US" dirty="0" smtClean="0">
+                <a:latin typeface="Hiragino Maru Gothic Pro W4" charset="-128"/>
+                <a:ea typeface="Hiragino Maru Gothic Pro W4" charset="-128"/>
+                <a:cs typeface="Hiragino Maru Gothic Pro W4" charset="-128"/>
+              </a:rPr>
+              <a:t>testing </a:t>
+            </a:r>
+            <a:r>
+              <a:rPr lang="en-US" dirty="0">
+                <a:latin typeface="Hiragino Maru Gothic Pro W4" charset="-128"/>
+                <a:ea typeface="Hiragino Maru Gothic Pro W4" charset="-128"/>
+                <a:cs typeface="Hiragino Maru Gothic Pro W4" charset="-128"/>
+              </a:rPr>
+              <a:t>utility for React that makes it easier to test your React </a:t>
+            </a:r>
+            <a:r>
+              <a:rPr lang="en-US" dirty="0" smtClean="0">
+                <a:latin typeface="Hiragino Maru Gothic Pro W4" charset="-128"/>
+                <a:ea typeface="Hiragino Maru Gothic Pro W4" charset="-128"/>
+                <a:cs typeface="Hiragino Maru Gothic Pro W4" charset="-128"/>
+              </a:rPr>
+              <a:t>components output</a:t>
+            </a:r>
+            <a:endParaRPr lang="en-US" dirty="0">
+              <a:latin typeface="Hiragino Maru Gothic Pro W4" charset="-128"/>
+              <a:ea typeface="Hiragino Maru Gothic Pro W4" charset="-128"/>
+              <a:cs typeface="Hiragino Maru Gothic Pro W4" charset="-128"/>
+            </a:endParaRPr>
+          </a:p>
+        </p:txBody>
+      </p:sp>
+      <p:sp>
+        <p:nvSpPr>
+          <p:cNvPr id="83" name="Google Shape;83;p15"/>
+          <p:cNvSpPr txBox="1">
+            <a:spLocks noGrp="1"/>
+          </p:cNvSpPr>
+          <p:nvPr>
+            <p:ph type="sldNum" idx="12"/>
+          </p:nvPr>
+        </p:nvSpPr>
+        <p:spPr>
+          <a:xfrm>
+            <a:off x="8480584" y="4749851"/>
+            <a:ext cx="548700" cy="393600"/>
+          </a:xfrm>
+          <a:prstGeom prst="rect">
+            <a:avLst/>
+          </a:prstGeom>
+        </p:spPr>
+        <p:txBody>
+          <a:bodyPr spcFirstLastPara="1" wrap="square" lIns="0" tIns="0" rIns="0" bIns="0" anchor="ctr" anchorCtr="0">
+            <a:noAutofit/>
+          </a:bodyPr>
+          <a:lstStyle/>
+          <a:p>
+            <a:pPr marL="0" lvl="0" indent="0" algn="r" rtl="0">
+              <a:spcBef>
+                <a:spcPts val="0"/>
+              </a:spcBef>
+              <a:spcAft>
+                <a:spcPts val="0"/>
+              </a:spcAft>
+              <a:buNone/>
+            </a:pPr>
+            <a:fld id="{00000000-1234-1234-1234-123412341234}" type="slidenum">
+              <a:rPr lang="en"/>
+              <a:t>6</a:t>
+            </a:fld>
+            <a:endParaRPr/>
+          </a:p>
+        </p:txBody>
+      </p:sp>
+    </p:spTree>
+    <p:extLst>
+      <p:ext uri="{BB962C8B-B14F-4D97-AF65-F5344CB8AC3E}">
+        <p14:creationId xmlns:p14="http://schemas.microsoft.com/office/powerpoint/2010/main" val="180948479"/>
+      </p:ext>
+    </p:extLst>
+  </p:cSld>
+  <p:clrMapOvr>
+    <a:masterClrMapping/>
+  </p:clrMapOvr>
+  <p:timing>
+    <p:tnLst>
+      <p:par>
+        <p:cTn id="1" dur="indefinite" restart="never" nodeType="tmRoot"/>
+      </p:par>
+    </p:tnLst>
+  </p:timing>
+</p:sld>
+</file>
+
+<file path=ppt/slides/slide7.xml><?xml version="1.0" encoding="utf-8"?>
+<p:sld xmlns:a="http://schemas.openxmlformats.org/drawingml/2006/main" xmlns:r="http://schemas.openxmlformats.org/officeDocument/2006/relationships" xmlns:p="http://schemas.openxmlformats.org/presentationml/2006/main">
+  <p:cSld>
+    <p:spTree>
+      <p:nvGrpSpPr>
+        <p:cNvPr id="1" name="Shape 80"/>
+        <p:cNvGrpSpPr/>
+        <p:nvPr/>
+      </p:nvGrpSpPr>
+      <p:grpSpPr>
+        <a:xfrm>
+          <a:off x="0" y="0"/>
+          <a:ext cx="0" cy="0"/>
+          <a:chOff x="0" y="0"/>
+          <a:chExt cx="0" cy="0"/>
+        </a:xfrm>
+      </p:grpSpPr>
+      <p:sp>
+        <p:nvSpPr>
+          <p:cNvPr id="81" name="Google Shape;81;p15"/>
+          <p:cNvSpPr txBox="1">
+            <a:spLocks noGrp="1"/>
+          </p:cNvSpPr>
+          <p:nvPr>
+            <p:ph type="title"/>
+          </p:nvPr>
+        </p:nvSpPr>
+        <p:spPr>
+          <a:xfrm>
+            <a:off x="457200" y="434575"/>
+            <a:ext cx="6025500" cy="857400"/>
+          </a:xfrm>
+          <a:prstGeom prst="rect">
+            <a:avLst/>
+          </a:prstGeom>
+        </p:spPr>
+        <p:txBody>
+          <a:bodyPr spcFirstLastPara="1" wrap="square" lIns="0" tIns="0" rIns="0" bIns="0" anchor="b" anchorCtr="0">
+            <a:noAutofit/>
+          </a:bodyPr>
+          <a:lstStyle/>
+          <a:p>
+            <a:pPr marL="0" lvl="0" indent="0" algn="l" rtl="0">
+              <a:spcBef>
+                <a:spcPts val="0"/>
+              </a:spcBef>
+              <a:spcAft>
+                <a:spcPts val="0"/>
+              </a:spcAft>
+              <a:buNone/>
+            </a:pPr>
+            <a:r>
+              <a:rPr lang="en-US" dirty="0" smtClean="0">
+                <a:latin typeface="Hiragino Kaku Gothic Std W8" charset="-128"/>
+                <a:ea typeface="Hiragino Kaku Gothic Std W8" charset="-128"/>
+                <a:cs typeface="Hiragino Kaku Gothic Std W8" charset="-128"/>
+              </a:rPr>
+              <a:t>ENZYME SHALLOW RENDERING</a:t>
+            </a:r>
+            <a:endParaRPr dirty="0">
+              <a:latin typeface="Hiragino Kaku Gothic Std W8" charset="-128"/>
+              <a:ea typeface="Hiragino Kaku Gothic Std W8" charset="-128"/>
+              <a:cs typeface="Hiragino Kaku Gothic Std W8" charset="-128"/>
+            </a:endParaRPr>
+          </a:p>
+        </p:txBody>
+      </p:sp>
+      <p:sp>
+        <p:nvSpPr>
+          <p:cNvPr id="82" name="Google Shape;82;p15"/>
+          <p:cNvSpPr txBox="1">
+            <a:spLocks noGrp="1"/>
+          </p:cNvSpPr>
+          <p:nvPr>
+            <p:ph type="body" idx="1"/>
+          </p:nvPr>
+        </p:nvSpPr>
+        <p:spPr>
+          <a:xfrm>
+            <a:off x="457199" y="1428748"/>
+            <a:ext cx="5730767" cy="3148800"/>
+          </a:xfrm>
+          <a:prstGeom prst="rect">
+            <a:avLst/>
+          </a:prstGeom>
+        </p:spPr>
+        <p:txBody>
+          <a:bodyPr spcFirstLastPara="1" wrap="square" lIns="0" tIns="0" rIns="0" bIns="0" anchor="t" anchorCtr="0">
+            <a:noAutofit/>
+          </a:bodyPr>
+          <a:lstStyle/>
+          <a:p>
+            <a:r>
+              <a:rPr lang="en-US" dirty="0">
+                <a:latin typeface="Hiragino Maru Gothic Pro W4" charset="-128"/>
+                <a:ea typeface="Hiragino Maru Gothic Pro W4" charset="-128"/>
+                <a:cs typeface="Hiragino Maru Gothic Pro W4" charset="-128"/>
+              </a:rPr>
+              <a:t>Renders only the single </a:t>
+            </a:r>
+            <a:r>
+              <a:rPr lang="en-US" dirty="0" smtClean="0">
+                <a:latin typeface="Hiragino Maru Gothic Pro W4" charset="-128"/>
+                <a:ea typeface="Hiragino Maru Gothic Pro W4" charset="-128"/>
+                <a:cs typeface="Hiragino Maru Gothic Pro W4" charset="-128"/>
+              </a:rPr>
+              <a:t>component, not </a:t>
+            </a:r>
+            <a:r>
+              <a:rPr lang="en-US" dirty="0">
+                <a:latin typeface="Hiragino Maru Gothic Pro W4" charset="-128"/>
+                <a:ea typeface="Hiragino Maru Gothic Pro W4" charset="-128"/>
+                <a:cs typeface="Hiragino Maru Gothic Pro W4" charset="-128"/>
+              </a:rPr>
+              <a:t>including its </a:t>
+            </a:r>
+            <a:r>
+              <a:rPr lang="en-US" dirty="0" smtClean="0">
+                <a:latin typeface="Hiragino Maru Gothic Pro W4" charset="-128"/>
+                <a:ea typeface="Hiragino Maru Gothic Pro W4" charset="-128"/>
+                <a:cs typeface="Hiragino Maru Gothic Pro W4" charset="-128"/>
+              </a:rPr>
+              <a:t>children</a:t>
+            </a:r>
+          </a:p>
+          <a:p>
+            <a:r>
+              <a:rPr lang="en-US" dirty="0">
+                <a:latin typeface="Hiragino Maru Gothic Pro W4" charset="-128"/>
+                <a:ea typeface="Hiragino Maru Gothic Pro W4" charset="-128"/>
+                <a:cs typeface="Hiragino Maru Gothic Pro W4" charset="-128"/>
+              </a:rPr>
+              <a:t>U</a:t>
+            </a:r>
+            <a:r>
+              <a:rPr lang="en-US" dirty="0" smtClean="0">
+                <a:latin typeface="Hiragino Maru Gothic Pro W4" charset="-128"/>
+                <a:ea typeface="Hiragino Maru Gothic Pro W4" charset="-128"/>
+                <a:cs typeface="Hiragino Maru Gothic Pro W4" charset="-128"/>
+              </a:rPr>
+              <a:t>seful </a:t>
+            </a:r>
+            <a:r>
+              <a:rPr lang="en-US" dirty="0">
+                <a:latin typeface="Hiragino Maru Gothic Pro W4" charset="-128"/>
+                <a:ea typeface="Hiragino Maru Gothic Pro W4" charset="-128"/>
+                <a:cs typeface="Hiragino Maru Gothic Pro W4" charset="-128"/>
+              </a:rPr>
+              <a:t>to isolate the component for pure unit testing. It protects against changes or bugs in a child component altering the </a:t>
+            </a:r>
+            <a:r>
+              <a:rPr lang="en-US" dirty="0" smtClean="0">
+                <a:latin typeface="Hiragino Maru Gothic Pro W4" charset="-128"/>
+                <a:ea typeface="Hiragino Maru Gothic Pro W4" charset="-128"/>
+                <a:cs typeface="Hiragino Maru Gothic Pro W4" charset="-128"/>
+              </a:rPr>
+              <a:t>behavior </a:t>
+            </a:r>
+            <a:r>
+              <a:rPr lang="en-US" dirty="0">
+                <a:latin typeface="Hiragino Maru Gothic Pro W4" charset="-128"/>
+                <a:ea typeface="Hiragino Maru Gothic Pro W4" charset="-128"/>
+                <a:cs typeface="Hiragino Maru Gothic Pro W4" charset="-128"/>
+              </a:rPr>
+              <a:t>or output of the component under </a:t>
+            </a:r>
+            <a:r>
+              <a:rPr lang="en-US" dirty="0" smtClean="0">
+                <a:latin typeface="Hiragino Maru Gothic Pro W4" charset="-128"/>
+                <a:ea typeface="Hiragino Maru Gothic Pro W4" charset="-128"/>
+                <a:cs typeface="Hiragino Maru Gothic Pro W4" charset="-128"/>
+              </a:rPr>
+              <a:t>test</a:t>
+            </a:r>
+            <a:endParaRPr lang="en-US" dirty="0">
+              <a:latin typeface="Hiragino Maru Gothic Pro W4" charset="-128"/>
+              <a:ea typeface="Hiragino Maru Gothic Pro W4" charset="-128"/>
+              <a:cs typeface="Hiragino Maru Gothic Pro W4" charset="-128"/>
+            </a:endParaRPr>
+          </a:p>
+        </p:txBody>
+      </p:sp>
+      <p:sp>
+        <p:nvSpPr>
+          <p:cNvPr id="83" name="Google Shape;83;p15"/>
+          <p:cNvSpPr txBox="1">
+            <a:spLocks noGrp="1"/>
+          </p:cNvSpPr>
+          <p:nvPr>
+            <p:ph type="sldNum" idx="12"/>
+          </p:nvPr>
+        </p:nvSpPr>
+        <p:spPr>
+          <a:xfrm>
+            <a:off x="8480584" y="4749851"/>
+            <a:ext cx="548700" cy="393600"/>
+          </a:xfrm>
+          <a:prstGeom prst="rect">
+            <a:avLst/>
+          </a:prstGeom>
+        </p:spPr>
+        <p:txBody>
+          <a:bodyPr spcFirstLastPara="1" wrap="square" lIns="0" tIns="0" rIns="0" bIns="0" anchor="ctr" anchorCtr="0">
+            <a:noAutofit/>
+          </a:bodyPr>
+          <a:lstStyle/>
+          <a:p>
+            <a:pPr marL="0" lvl="0" indent="0" algn="r" rtl="0">
+              <a:spcBef>
+                <a:spcPts val="0"/>
+              </a:spcBef>
+              <a:spcAft>
+                <a:spcPts val="0"/>
+              </a:spcAft>
+              <a:buNone/>
+            </a:pPr>
+            <a:fld id="{00000000-1234-1234-1234-123412341234}" type="slidenum">
+              <a:rPr lang="en"/>
+              <a:t>7</a:t>
+            </a:fld>
+            <a:endParaRPr/>
+          </a:p>
+        </p:txBody>
+      </p:sp>
+    </p:spTree>
+    <p:extLst>
+      <p:ext uri="{BB962C8B-B14F-4D97-AF65-F5344CB8AC3E}">
+        <p14:creationId xmlns:p14="http://schemas.microsoft.com/office/powerpoint/2010/main" val="1979770742"/>
+      </p:ext>
+    </p:extLst>
+  </p:cSld>
+  <p:clrMapOvr>
+    <a:masterClrMapping/>
+  </p:clrMapOvr>
+  <p:timing>
+    <p:tnLst>
+      <p:par>
+        <p:cTn id="1" dur="indefinite" restart="never" nodeType="tmRoot"/>
+      </p:par>
+    </p:tnLst>
+  </p:timing>
+</p:sld>
+</file>
+
+<file path=ppt/slides/slide8.xml><?xml version="1.0" encoding="utf-8"?>
+<p:sld xmlns:a="http://schemas.openxmlformats.org/drawingml/2006/main" xmlns:r="http://schemas.openxmlformats.org/officeDocument/2006/relationships" xmlns:p="http://schemas.openxmlformats.org/presentationml/2006/main">
+  <p:cSld>
+    <p:spTree>
+      <p:nvGrpSpPr>
+        <p:cNvPr id="1" name="Shape 80"/>
+        <p:cNvGrpSpPr/>
+        <p:nvPr/>
+      </p:nvGrpSpPr>
+      <p:grpSpPr>
+        <a:xfrm>
+          <a:off x="0" y="0"/>
+          <a:ext cx="0" cy="0"/>
+          <a:chOff x="0" y="0"/>
+          <a:chExt cx="0" cy="0"/>
+        </a:xfrm>
+      </p:grpSpPr>
+      <p:sp>
+        <p:nvSpPr>
+          <p:cNvPr id="81" name="Google Shape;81;p15"/>
+          <p:cNvSpPr txBox="1">
+            <a:spLocks noGrp="1"/>
+          </p:cNvSpPr>
+          <p:nvPr>
+            <p:ph type="title"/>
+          </p:nvPr>
+        </p:nvSpPr>
+        <p:spPr>
+          <a:xfrm>
+            <a:off x="457200" y="434575"/>
+            <a:ext cx="6025500" cy="857400"/>
+          </a:xfrm>
+          <a:prstGeom prst="rect">
+            <a:avLst/>
+          </a:prstGeom>
+        </p:spPr>
+        <p:txBody>
+          <a:bodyPr spcFirstLastPara="1" wrap="square" lIns="0" tIns="0" rIns="0" bIns="0" anchor="b" anchorCtr="0">
+            <a:noAutofit/>
+          </a:bodyPr>
+          <a:lstStyle/>
+          <a:p>
+            <a:pPr marL="0" lvl="0" indent="0" algn="l" rtl="0">
+              <a:spcBef>
+                <a:spcPts val="0"/>
+              </a:spcBef>
+              <a:spcAft>
+                <a:spcPts val="0"/>
+              </a:spcAft>
+              <a:buNone/>
+            </a:pPr>
+            <a:r>
+              <a:rPr lang="en-US" dirty="0" smtClean="0">
+                <a:latin typeface="Hiragino Kaku Gothic Std W8" charset="-128"/>
+                <a:ea typeface="Hiragino Kaku Gothic Std W8" charset="-128"/>
+                <a:cs typeface="Hiragino Kaku Gothic Std W8" charset="-128"/>
+              </a:rPr>
+              <a:t>ENZYME MOUNT RENDERING</a:t>
+            </a:r>
+            <a:endParaRPr dirty="0">
+              <a:latin typeface="Hiragino Kaku Gothic Std W8" charset="-128"/>
+              <a:ea typeface="Hiragino Kaku Gothic Std W8" charset="-128"/>
+              <a:cs typeface="Hiragino Kaku Gothic Std W8" charset="-128"/>
+            </a:endParaRPr>
+          </a:p>
+        </p:txBody>
+      </p:sp>
+      <p:sp>
+        <p:nvSpPr>
+          <p:cNvPr id="82" name="Google Shape;82;p15"/>
+          <p:cNvSpPr txBox="1">
+            <a:spLocks noGrp="1"/>
+          </p:cNvSpPr>
+          <p:nvPr>
+            <p:ph type="body" idx="1"/>
+          </p:nvPr>
+        </p:nvSpPr>
+        <p:spPr>
+          <a:xfrm>
+            <a:off x="457199" y="1428748"/>
+            <a:ext cx="5730767" cy="3148800"/>
+          </a:xfrm>
+          <a:prstGeom prst="rect">
+            <a:avLst/>
+          </a:prstGeom>
+        </p:spPr>
+        <p:txBody>
+          <a:bodyPr spcFirstLastPara="1" wrap="square" lIns="0" tIns="0" rIns="0" bIns="0" anchor="t" anchorCtr="0">
+            <a:noAutofit/>
+          </a:bodyPr>
+          <a:lstStyle/>
+          <a:p>
+            <a:r>
+              <a:rPr lang="en-US" dirty="0">
+                <a:latin typeface="Hiragino Maru Gothic Pro W4" charset="-128"/>
+                <a:ea typeface="Hiragino Maru Gothic Pro W4" charset="-128"/>
+                <a:cs typeface="Hiragino Maru Gothic Pro W4" charset="-128"/>
+              </a:rPr>
+              <a:t>Full DOM rendering including child components</a:t>
+            </a:r>
+          </a:p>
+          <a:p>
+            <a:r>
+              <a:rPr lang="en-US" dirty="0">
+                <a:latin typeface="Hiragino Maru Gothic Pro W4" charset="-128"/>
+                <a:ea typeface="Hiragino Maru Gothic Pro W4" charset="-128"/>
+                <a:cs typeface="Hiragino Maru Gothic Pro W4" charset="-128"/>
+              </a:rPr>
+              <a:t>Ideal for use cases where you have components that may interact with DOM API, or use React lifecycle methods in order to fully test the component</a:t>
+            </a:r>
+          </a:p>
+        </p:txBody>
+      </p:sp>
+      <p:sp>
+        <p:nvSpPr>
+          <p:cNvPr id="83" name="Google Shape;83;p15"/>
+          <p:cNvSpPr txBox="1">
+            <a:spLocks noGrp="1"/>
+          </p:cNvSpPr>
+          <p:nvPr>
+            <p:ph type="sldNum" idx="12"/>
+          </p:nvPr>
+        </p:nvSpPr>
+        <p:spPr>
+          <a:xfrm>
+            <a:off x="8480584" y="4749851"/>
+            <a:ext cx="548700" cy="393600"/>
+          </a:xfrm>
+          <a:prstGeom prst="rect">
+            <a:avLst/>
+          </a:prstGeom>
+        </p:spPr>
+        <p:txBody>
+          <a:bodyPr spcFirstLastPara="1" wrap="square" lIns="0" tIns="0" rIns="0" bIns="0" anchor="ctr" anchorCtr="0">
+            <a:noAutofit/>
+          </a:bodyPr>
+          <a:lstStyle/>
+          <a:p>
+            <a:pPr marL="0" lvl="0" indent="0" algn="r" rtl="0">
+              <a:spcBef>
+                <a:spcPts val="0"/>
+              </a:spcBef>
+              <a:spcAft>
+                <a:spcPts val="0"/>
+              </a:spcAft>
+              <a:buNone/>
+            </a:pPr>
+            <a:fld id="{00000000-1234-1234-1234-123412341234}" type="slidenum">
+              <a:rPr lang="en"/>
+              <a:t>8</a:t>
+            </a:fld>
+            <a:endParaRPr/>
+          </a:p>
+        </p:txBody>
+      </p:sp>
+    </p:spTree>
+    <p:extLst>
+      <p:ext uri="{BB962C8B-B14F-4D97-AF65-F5344CB8AC3E}">
+        <p14:creationId xmlns:p14="http://schemas.microsoft.com/office/powerpoint/2010/main" val="1748347986"/>
+      </p:ext>
+    </p:extLst>
+  </p:cSld>
+  <p:clrMapOvr>
+    <a:masterClrMapping/>
+  </p:clrMapOvr>
+  <p:timing>
+    <p:tnLst>
+      <p:par>
+        <p:cTn id="1" dur="indefinite" restart="never" nodeType="tmRoot"/>
+      </p:par>
+    </p:tnLst>
+  </p:timing>
+</p:sld>
+</file>
+
+<file path=ppt/slides/slide9.xml><?xml version="1.0" encoding="utf-8"?>
+<p:sld xmlns:a="http://schemas.openxmlformats.org/drawingml/2006/main" xmlns:r="http://schemas.openxmlformats.org/officeDocument/2006/relationships" xmlns:p="http://schemas.openxmlformats.org/presentationml/2006/main">
+  <p:cSld>
+    <p:spTree>
+      <p:nvGrpSpPr>
         <p:cNvPr id="1" name="Shape 53"/>
         <p:cNvGrpSpPr/>
         <p:nvPr/>
@@ -6105,93 +7182,6 @@
     <p:extLst>
       <p:ext uri="{BB962C8B-B14F-4D97-AF65-F5344CB8AC3E}">
         <p14:creationId xmlns:p14="http://schemas.microsoft.com/office/powerpoint/2010/main" val="797108256"/>
-      </p:ext>
-    </p:extLst>
-  </p:cSld>
-  <p:clrMapOvr>
-    <a:masterClrMapping/>
-  </p:clrMapOvr>
-  <p:timing>
-    <p:tnLst>
-      <p:par>
-        <p:cTn id="1" dur="indefinite" restart="never" nodeType="tmRoot"/>
-      </p:par>
-    </p:tnLst>
-  </p:timing>
-</p:sld>
-</file>
-
-<file path=ppt/slides/slide7.xml><?xml version="1.0" encoding="utf-8"?>
-<p:sld xmlns:a="http://schemas.openxmlformats.org/drawingml/2006/main" xmlns:r="http://schemas.openxmlformats.org/officeDocument/2006/relationships" xmlns:p="http://schemas.openxmlformats.org/presentationml/2006/main">
-  <p:cSld>
-    <p:spTree>
-      <p:nvGrpSpPr>
-        <p:cNvPr id="1" name="Shape 53"/>
-        <p:cNvGrpSpPr/>
-        <p:nvPr/>
-      </p:nvGrpSpPr>
-      <p:grpSpPr>
-        <a:xfrm>
-          <a:off x="0" y="0"/>
-          <a:ext cx="0" cy="0"/>
-          <a:chOff x="0" y="0"/>
-          <a:chExt cx="0" cy="0"/>
-        </a:xfrm>
-      </p:grpSpPr>
-      <p:sp>
-        <p:nvSpPr>
-          <p:cNvPr id="54" name="Google Shape;54;p11"/>
-          <p:cNvSpPr txBox="1">
-            <a:spLocks noGrp="1"/>
-          </p:cNvSpPr>
-          <p:nvPr>
-            <p:ph type="ctrTitle"/>
-          </p:nvPr>
-        </p:nvSpPr>
-        <p:spPr>
-          <a:xfrm>
-            <a:off x="685800" y="743850"/>
-            <a:ext cx="7102642" cy="1159800"/>
-          </a:xfrm>
-          <a:prstGeom prst="rect">
-            <a:avLst/>
-          </a:prstGeom>
-        </p:spPr>
-        <p:txBody>
-          <a:bodyPr spcFirstLastPara="1" wrap="square" lIns="0" tIns="0" rIns="0" bIns="0" anchor="t" anchorCtr="0">
-            <a:noAutofit/>
-          </a:bodyPr>
-          <a:lstStyle/>
-          <a:p>
-            <a:pPr marL="0" lvl="0" indent="0" algn="l" rtl="0">
-              <a:spcBef>
-                <a:spcPts val="0"/>
-              </a:spcBef>
-              <a:spcAft>
-                <a:spcPts val="0"/>
-              </a:spcAft>
-              <a:buNone/>
-            </a:pPr>
-            <a:r>
-              <a:rPr lang="en-US" dirty="0" smtClean="0">
-                <a:latin typeface="Hiragino Kaku Gothic Std W8" charset="-128"/>
-                <a:ea typeface="Hiragino Kaku Gothic Std W8" charset="-128"/>
-                <a:cs typeface="Hiragino Kaku Gothic Std W8" charset="-128"/>
-              </a:rPr>
-              <a:t>QUESTIONS?</a:t>
-            </a:r>
-            <a:endParaRPr dirty="0">
-              <a:latin typeface="Hiragino Kaku Gothic Std W8" charset="-128"/>
-              <a:ea typeface="Hiragino Kaku Gothic Std W8" charset="-128"/>
-              <a:cs typeface="Hiragino Kaku Gothic Std W8" charset="-128"/>
-            </a:endParaRPr>
-          </a:p>
-        </p:txBody>
-      </p:sp>
-    </p:spTree>
-    <p:extLst>
-      <p:ext uri="{BB962C8B-B14F-4D97-AF65-F5344CB8AC3E}">
-        <p14:creationId xmlns:p14="http://schemas.microsoft.com/office/powerpoint/2010/main" val="100565651"/>
       </p:ext>
     </p:extLst>
   </p:cSld>

</xml_diff>